<commit_message>
Added missing images and updated Bachelor thesis
</commit_message>
<xml_diff>
--- a/thesis/photobooth_sketch.pptx
+++ b/thesis/photobooth_sketch.pptx
@@ -104,6 +104,11 @@
       </a:defRPr>
     </a:lvl9pPr>
   </p:defaultTextStyle>
+  <p:extLst>
+    <p:ext uri="{EFAFB233-063F-42B5-8137-9DF3F51BA10A}">
+      <p15:sldGuideLst xmlns:p15="http://schemas.microsoft.com/office/powerpoint/2012/main"/>
+    </p:ext>
+  </p:extLst>
 </p:presentation>
 </file>
 
@@ -238,7 +243,7 @@
           <a:p>
             <a:fld id="{FA936BF5-FCB6-4F4C-AD1D-23D00E388CD3}" type="datetimeFigureOut">
               <a:rPr lang="de-DE" smtClean="0"/>
-              <a:t>24.08.2016</a:t>
+              <a:t>25.08.2016</a:t>
             </a:fld>
             <a:endParaRPr lang="de-DE"/>
           </a:p>
@@ -408,7 +413,7 @@
           <a:p>
             <a:fld id="{FA936BF5-FCB6-4F4C-AD1D-23D00E388CD3}" type="datetimeFigureOut">
               <a:rPr lang="de-DE" smtClean="0"/>
-              <a:t>24.08.2016</a:t>
+              <a:t>25.08.2016</a:t>
             </a:fld>
             <a:endParaRPr lang="de-DE"/>
           </a:p>
@@ -588,7 +593,7 @@
           <a:p>
             <a:fld id="{FA936BF5-FCB6-4F4C-AD1D-23D00E388CD3}" type="datetimeFigureOut">
               <a:rPr lang="de-DE" smtClean="0"/>
-              <a:t>24.08.2016</a:t>
+              <a:t>25.08.2016</a:t>
             </a:fld>
             <a:endParaRPr lang="de-DE"/>
           </a:p>
@@ -758,7 +763,7 @@
           <a:p>
             <a:fld id="{FA936BF5-FCB6-4F4C-AD1D-23D00E388CD3}" type="datetimeFigureOut">
               <a:rPr lang="de-DE" smtClean="0"/>
-              <a:t>24.08.2016</a:t>
+              <a:t>25.08.2016</a:t>
             </a:fld>
             <a:endParaRPr lang="de-DE"/>
           </a:p>
@@ -1004,7 +1009,7 @@
           <a:p>
             <a:fld id="{FA936BF5-FCB6-4F4C-AD1D-23D00E388CD3}" type="datetimeFigureOut">
               <a:rPr lang="de-DE" smtClean="0"/>
-              <a:t>24.08.2016</a:t>
+              <a:t>25.08.2016</a:t>
             </a:fld>
             <a:endParaRPr lang="de-DE"/>
           </a:p>
@@ -1236,7 +1241,7 @@
           <a:p>
             <a:fld id="{FA936BF5-FCB6-4F4C-AD1D-23D00E388CD3}" type="datetimeFigureOut">
               <a:rPr lang="de-DE" smtClean="0"/>
-              <a:t>24.08.2016</a:t>
+              <a:t>25.08.2016</a:t>
             </a:fld>
             <a:endParaRPr lang="de-DE"/>
           </a:p>
@@ -1603,7 +1608,7 @@
           <a:p>
             <a:fld id="{FA936BF5-FCB6-4F4C-AD1D-23D00E388CD3}" type="datetimeFigureOut">
               <a:rPr lang="de-DE" smtClean="0"/>
-              <a:t>24.08.2016</a:t>
+              <a:t>25.08.2016</a:t>
             </a:fld>
             <a:endParaRPr lang="de-DE"/>
           </a:p>
@@ -1721,7 +1726,7 @@
           <a:p>
             <a:fld id="{FA936BF5-FCB6-4F4C-AD1D-23D00E388CD3}" type="datetimeFigureOut">
               <a:rPr lang="de-DE" smtClean="0"/>
-              <a:t>24.08.2016</a:t>
+              <a:t>25.08.2016</a:t>
             </a:fld>
             <a:endParaRPr lang="de-DE"/>
           </a:p>
@@ -1816,7 +1821,7 @@
           <a:p>
             <a:fld id="{FA936BF5-FCB6-4F4C-AD1D-23D00E388CD3}" type="datetimeFigureOut">
               <a:rPr lang="de-DE" smtClean="0"/>
-              <a:t>24.08.2016</a:t>
+              <a:t>25.08.2016</a:t>
             </a:fld>
             <a:endParaRPr lang="de-DE"/>
           </a:p>
@@ -2093,7 +2098,7 @@
           <a:p>
             <a:fld id="{FA936BF5-FCB6-4F4C-AD1D-23D00E388CD3}" type="datetimeFigureOut">
               <a:rPr lang="de-DE" smtClean="0"/>
-              <a:t>24.08.2016</a:t>
+              <a:t>25.08.2016</a:t>
             </a:fld>
             <a:endParaRPr lang="de-DE"/>
           </a:p>
@@ -2346,7 +2351,7 @@
           <a:p>
             <a:fld id="{FA936BF5-FCB6-4F4C-AD1D-23D00E388CD3}" type="datetimeFigureOut">
               <a:rPr lang="de-DE" smtClean="0"/>
-              <a:t>24.08.2016</a:t>
+              <a:t>25.08.2016</a:t>
             </a:fld>
             <a:endParaRPr lang="de-DE"/>
           </a:p>
@@ -2559,7 +2564,7 @@
           <a:p>
             <a:fld id="{FA936BF5-FCB6-4F4C-AD1D-23D00E388CD3}" type="datetimeFigureOut">
               <a:rPr lang="de-DE" smtClean="0"/>
-              <a:t>24.08.2016</a:t>
+              <a:t>25.08.2016</a:t>
             </a:fld>
             <a:endParaRPr lang="de-DE"/>
           </a:p>
@@ -2981,7 +2986,7 @@
           <a:solidFill>
             <a:schemeClr val="bg1"/>
           </a:solidFill>
-          <a:ln>
+          <a:ln w="25400">
             <a:solidFill>
               <a:schemeClr val="tx1"/>
             </a:solidFill>
@@ -3020,7 +3025,7 @@
         </p:nvSpPr>
         <p:spPr>
           <a:xfrm>
-            <a:off x="5539424" y="4409630"/>
+            <a:off x="5524817" y="4409629"/>
             <a:ext cx="504000" cy="504000"/>
           </a:xfrm>
           <a:prstGeom prst="ellipse">
@@ -3029,7 +3034,7 @@
           <a:solidFill>
             <a:schemeClr val="bg1"/>
           </a:solidFill>
-          <a:ln>
+          <a:ln w="25400">
             <a:solidFill>
               <a:schemeClr val="tx1"/>
             </a:solidFill>
@@ -3082,7 +3087,7 @@
           <a:solidFill>
             <a:schemeClr val="bg1"/>
           </a:solidFill>
-          <a:ln>
+          <a:ln w="25400">
             <a:solidFill>
               <a:schemeClr val="tx1"/>
             </a:solidFill>
@@ -3116,16 +3121,13 @@
       <p:cxnSp>
         <p:nvCxnSpPr>
           <p:cNvPr id="8" name="Gerader Verbinder 7"/>
-          <p:cNvCxnSpPr>
-            <a:stCxn id="4" idx="0"/>
-            <a:endCxn id="4" idx="2"/>
-          </p:cNvCxnSpPr>
+          <p:cNvCxnSpPr/>
           <p:nvPr/>
         </p:nvCxnSpPr>
         <p:spPr>
           <a:xfrm>
-            <a:off x="5791424" y="1350236"/>
-            <a:ext cx="0" cy="3960000"/>
+            <a:off x="5768412" y="1042587"/>
+            <a:ext cx="0" cy="4608000"/>
           </a:xfrm>
           <a:prstGeom prst="line">
             <a:avLst/>
@@ -3134,7 +3136,7 @@
             <a:solidFill>
               <a:schemeClr val="tx1"/>
             </a:solidFill>
-            <a:prstDash val="dash"/>
+            <a:prstDash val="dashDot"/>
           </a:ln>
         </p:spPr>
         <p:style>
@@ -3167,6 +3169,9 @@
             <a:avLst/>
           </a:prstGeom>
           <a:noFill/>
+          <a:ln>
+            <a:noFill/>
+          </a:ln>
         </p:spPr>
         <p:txBody>
           <a:bodyPr wrap="square" rtlCol="0">
@@ -3178,7 +3183,13 @@
               <a:rPr lang="de-DE" sz="1200" dirty="0" smtClean="0">
                 <a:latin typeface="Palatino Linotype" panose="02040502050505030304" pitchFamily="18" charset="0"/>
               </a:rPr>
-              <a:t>Ø 7cm</a:t>
+              <a:t>Ø </a:t>
+            </a:r>
+            <a:r>
+              <a:rPr lang="de-DE" sz="1200" dirty="0" smtClean="0">
+                <a:latin typeface="Palatino Linotype" panose="02040502050505030304" pitchFamily="18" charset="0"/>
+              </a:rPr>
+              <a:t>70</a:t>
             </a:r>
             <a:endParaRPr lang="de-DE" sz="1200" dirty="0">
               <a:latin typeface="Palatino Linotype" panose="02040502050505030304" pitchFamily="18" charset="0"/>
@@ -3186,6 +3197,1009 @@
           </a:p>
         </p:txBody>
       </p:sp>
+      <p:cxnSp>
+        <p:nvCxnSpPr>
+          <p:cNvPr id="3" name="Gerader Verbinder 2"/>
+          <p:cNvCxnSpPr/>
+          <p:nvPr/>
+        </p:nvCxnSpPr>
+        <p:spPr>
+          <a:xfrm flipH="1">
+            <a:off x="2638423" y="1359761"/>
+            <a:ext cx="360000" cy="0"/>
+          </a:xfrm>
+          <a:prstGeom prst="line">
+            <a:avLst/>
+          </a:prstGeom>
+          <a:ln>
+            <a:solidFill>
+              <a:schemeClr val="tx1"/>
+            </a:solidFill>
+          </a:ln>
+        </p:spPr>
+        <p:style>
+          <a:lnRef idx="1">
+            <a:schemeClr val="accent1"/>
+          </a:lnRef>
+          <a:fillRef idx="0">
+            <a:schemeClr val="accent1"/>
+          </a:fillRef>
+          <a:effectRef idx="0">
+            <a:schemeClr val="accent1"/>
+          </a:effectRef>
+          <a:fontRef idx="minor">
+            <a:schemeClr val="tx1"/>
+          </a:fontRef>
+        </p:style>
+      </p:cxnSp>
+      <p:cxnSp>
+        <p:nvCxnSpPr>
+          <p:cNvPr id="13" name="Gerade Verbindung mit Pfeil 12"/>
+          <p:cNvCxnSpPr/>
+          <p:nvPr/>
+        </p:nvCxnSpPr>
+        <p:spPr>
+          <a:xfrm flipV="1">
+            <a:off x="2820548" y="1359761"/>
+            <a:ext cx="0" cy="1800000"/>
+          </a:xfrm>
+          <a:prstGeom prst="straightConnector1">
+            <a:avLst/>
+          </a:prstGeom>
+          <a:ln>
+            <a:solidFill>
+              <a:schemeClr val="tx1"/>
+            </a:solidFill>
+            <a:tailEnd type="triangle"/>
+          </a:ln>
+        </p:spPr>
+        <p:style>
+          <a:lnRef idx="1">
+            <a:schemeClr val="accent1"/>
+          </a:lnRef>
+          <a:fillRef idx="0">
+            <a:schemeClr val="accent1"/>
+          </a:fillRef>
+          <a:effectRef idx="0">
+            <a:schemeClr val="accent1"/>
+          </a:effectRef>
+          <a:fontRef idx="minor">
+            <a:schemeClr val="tx1"/>
+          </a:fontRef>
+        </p:style>
+      </p:cxnSp>
+      <p:cxnSp>
+        <p:nvCxnSpPr>
+          <p:cNvPr id="14" name="Gerade Verbindung mit Pfeil 13"/>
+          <p:cNvCxnSpPr/>
+          <p:nvPr/>
+        </p:nvCxnSpPr>
+        <p:spPr>
+          <a:xfrm>
+            <a:off x="2820548" y="3523270"/>
+            <a:ext cx="0" cy="1800000"/>
+          </a:xfrm>
+          <a:prstGeom prst="straightConnector1">
+            <a:avLst/>
+          </a:prstGeom>
+          <a:ln>
+            <a:solidFill>
+              <a:schemeClr val="tx1"/>
+            </a:solidFill>
+            <a:tailEnd type="triangle"/>
+          </a:ln>
+        </p:spPr>
+        <p:style>
+          <a:lnRef idx="1">
+            <a:schemeClr val="accent1"/>
+          </a:lnRef>
+          <a:fillRef idx="0">
+            <a:schemeClr val="accent1"/>
+          </a:fillRef>
+          <a:effectRef idx="0">
+            <a:schemeClr val="accent1"/>
+          </a:effectRef>
+          <a:fontRef idx="minor">
+            <a:schemeClr val="tx1"/>
+          </a:fontRef>
+        </p:style>
+      </p:cxnSp>
+      <p:sp>
+        <p:nvSpPr>
+          <p:cNvPr id="17" name="Textfeld 16"/>
+          <p:cNvSpPr txBox="1"/>
+          <p:nvPr/>
+        </p:nvSpPr>
+        <p:spPr>
+          <a:xfrm rot="16200000">
+            <a:off x="2621470" y="3190918"/>
+            <a:ext cx="417758" cy="246221"/>
+          </a:xfrm>
+          <a:prstGeom prst="rect">
+            <a:avLst/>
+          </a:prstGeom>
+          <a:noFill/>
+          <a:ln>
+            <a:noFill/>
+          </a:ln>
+        </p:spPr>
+        <p:txBody>
+          <a:bodyPr wrap="square" rtlCol="0">
+            <a:spAutoFit/>
+          </a:bodyPr>
+          <a:lstStyle/>
+          <a:p>
+            <a:r>
+              <a:rPr lang="de-DE" sz="1000" dirty="0" smtClean="0">
+                <a:latin typeface="Palatino Linotype" panose="02040502050505030304" pitchFamily="18" charset="0"/>
+              </a:rPr>
+              <a:t>550</a:t>
+            </a:r>
+            <a:endParaRPr lang="de-DE" sz="1000" dirty="0">
+              <a:latin typeface="Palatino Linotype" panose="02040502050505030304" pitchFamily="18" charset="0"/>
+            </a:endParaRPr>
+          </a:p>
+        </p:txBody>
+      </p:sp>
+      <p:cxnSp>
+        <p:nvCxnSpPr>
+          <p:cNvPr id="19" name="Gerader Verbinder 18"/>
+          <p:cNvCxnSpPr/>
+          <p:nvPr/>
+        </p:nvCxnSpPr>
+        <p:spPr>
+          <a:xfrm flipH="1">
+            <a:off x="3022980" y="2429143"/>
+            <a:ext cx="360000" cy="0"/>
+          </a:xfrm>
+          <a:prstGeom prst="line">
+            <a:avLst/>
+          </a:prstGeom>
+          <a:ln>
+            <a:solidFill>
+              <a:schemeClr val="tx1"/>
+            </a:solidFill>
+          </a:ln>
+        </p:spPr>
+        <p:style>
+          <a:lnRef idx="1">
+            <a:schemeClr val="accent1"/>
+          </a:lnRef>
+          <a:fillRef idx="0">
+            <a:schemeClr val="accent1"/>
+          </a:fillRef>
+          <a:effectRef idx="0">
+            <a:schemeClr val="accent1"/>
+          </a:effectRef>
+          <a:fontRef idx="minor">
+            <a:schemeClr val="tx1"/>
+          </a:fontRef>
+        </p:style>
+      </p:cxnSp>
+      <p:cxnSp>
+        <p:nvCxnSpPr>
+          <p:cNvPr id="28" name="Gerade Verbindung mit Pfeil 27"/>
+          <p:cNvCxnSpPr/>
+          <p:nvPr/>
+        </p:nvCxnSpPr>
+        <p:spPr>
+          <a:xfrm>
+            <a:off x="3204130" y="2257693"/>
+            <a:ext cx="0" cy="180000"/>
+          </a:xfrm>
+          <a:prstGeom prst="straightConnector1">
+            <a:avLst/>
+          </a:prstGeom>
+          <a:ln>
+            <a:solidFill>
+              <a:schemeClr val="tx1"/>
+            </a:solidFill>
+            <a:tailEnd type="triangle"/>
+          </a:ln>
+        </p:spPr>
+        <p:style>
+          <a:lnRef idx="1">
+            <a:schemeClr val="accent1"/>
+          </a:lnRef>
+          <a:fillRef idx="0">
+            <a:schemeClr val="accent1"/>
+          </a:fillRef>
+          <a:effectRef idx="0">
+            <a:schemeClr val="accent1"/>
+          </a:effectRef>
+          <a:fontRef idx="minor">
+            <a:schemeClr val="tx1"/>
+          </a:fontRef>
+        </p:style>
+      </p:cxnSp>
+      <p:sp>
+        <p:nvSpPr>
+          <p:cNvPr id="32" name="Textfeld 31"/>
+          <p:cNvSpPr txBox="1"/>
+          <p:nvPr/>
+        </p:nvSpPr>
+        <p:spPr>
+          <a:xfrm rot="16200000">
+            <a:off x="3008168" y="1971895"/>
+            <a:ext cx="399063" cy="246221"/>
+          </a:xfrm>
+          <a:prstGeom prst="rect">
+            <a:avLst/>
+          </a:prstGeom>
+          <a:noFill/>
+          <a:ln>
+            <a:noFill/>
+          </a:ln>
+        </p:spPr>
+        <p:txBody>
+          <a:bodyPr wrap="square" rtlCol="0">
+            <a:spAutoFit/>
+          </a:bodyPr>
+          <a:lstStyle/>
+          <a:p>
+            <a:r>
+              <a:rPr lang="de-DE" sz="1000" dirty="0" smtClean="0">
+                <a:latin typeface="Palatino Linotype" panose="02040502050505030304" pitchFamily="18" charset="0"/>
+              </a:rPr>
+              <a:t>151</a:t>
+            </a:r>
+            <a:endParaRPr lang="de-DE" sz="1000" dirty="0">
+              <a:latin typeface="Palatino Linotype" panose="02040502050505030304" pitchFamily="18" charset="0"/>
+            </a:endParaRPr>
+          </a:p>
+        </p:txBody>
+      </p:sp>
+      <p:cxnSp>
+        <p:nvCxnSpPr>
+          <p:cNvPr id="34" name="Gerader Verbinder 33"/>
+          <p:cNvCxnSpPr/>
+          <p:nvPr/>
+        </p:nvCxnSpPr>
+        <p:spPr>
+          <a:xfrm flipH="1">
+            <a:off x="3415433" y="4675505"/>
+            <a:ext cx="360000" cy="0"/>
+          </a:xfrm>
+          <a:prstGeom prst="line">
+            <a:avLst/>
+          </a:prstGeom>
+          <a:ln>
+            <a:solidFill>
+              <a:schemeClr val="tx1"/>
+            </a:solidFill>
+          </a:ln>
+        </p:spPr>
+        <p:style>
+          <a:lnRef idx="1">
+            <a:schemeClr val="accent1"/>
+          </a:lnRef>
+          <a:fillRef idx="0">
+            <a:schemeClr val="accent1"/>
+          </a:fillRef>
+          <a:effectRef idx="0">
+            <a:schemeClr val="accent1"/>
+          </a:effectRef>
+          <a:fontRef idx="minor">
+            <a:schemeClr val="tx1"/>
+          </a:fontRef>
+        </p:style>
+      </p:cxnSp>
+      <p:cxnSp>
+        <p:nvCxnSpPr>
+          <p:cNvPr id="36" name="Gerader Verbinder 35"/>
+          <p:cNvCxnSpPr/>
+          <p:nvPr/>
+        </p:nvCxnSpPr>
+        <p:spPr>
+          <a:xfrm flipH="1" flipV="1">
+            <a:off x="2638425" y="5320202"/>
+            <a:ext cx="1134000" cy="0"/>
+          </a:xfrm>
+          <a:prstGeom prst="line">
+            <a:avLst/>
+          </a:prstGeom>
+          <a:ln>
+            <a:solidFill>
+              <a:schemeClr val="tx1"/>
+            </a:solidFill>
+          </a:ln>
+        </p:spPr>
+        <p:style>
+          <a:lnRef idx="1">
+            <a:schemeClr val="accent1"/>
+          </a:lnRef>
+          <a:fillRef idx="0">
+            <a:schemeClr val="accent1"/>
+          </a:fillRef>
+          <a:effectRef idx="0">
+            <a:schemeClr val="accent1"/>
+          </a:effectRef>
+          <a:fontRef idx="minor">
+            <a:schemeClr val="tx1"/>
+          </a:fontRef>
+        </p:style>
+      </p:cxnSp>
+      <p:cxnSp>
+        <p:nvCxnSpPr>
+          <p:cNvPr id="41" name="Gerade Verbindung mit Pfeil 40"/>
+          <p:cNvCxnSpPr/>
+          <p:nvPr/>
+        </p:nvCxnSpPr>
+        <p:spPr>
+          <a:xfrm>
+            <a:off x="3590770" y="5142230"/>
+            <a:ext cx="0" cy="180000"/>
+          </a:xfrm>
+          <a:prstGeom prst="straightConnector1">
+            <a:avLst/>
+          </a:prstGeom>
+          <a:ln>
+            <a:solidFill>
+              <a:schemeClr val="tx1"/>
+            </a:solidFill>
+            <a:tailEnd type="triangle"/>
+          </a:ln>
+        </p:spPr>
+        <p:style>
+          <a:lnRef idx="1">
+            <a:schemeClr val="accent1"/>
+          </a:lnRef>
+          <a:fillRef idx="0">
+            <a:schemeClr val="accent1"/>
+          </a:fillRef>
+          <a:effectRef idx="0">
+            <a:schemeClr val="accent1"/>
+          </a:effectRef>
+          <a:fontRef idx="minor">
+            <a:schemeClr val="tx1"/>
+          </a:fontRef>
+        </p:style>
+      </p:cxnSp>
+      <p:sp>
+        <p:nvSpPr>
+          <p:cNvPr id="49" name="Textfeld 48"/>
+          <p:cNvSpPr txBox="1"/>
+          <p:nvPr/>
+        </p:nvSpPr>
+        <p:spPr>
+          <a:xfrm rot="16200000">
+            <a:off x="3430402" y="4860599"/>
+            <a:ext cx="349714" cy="246221"/>
+          </a:xfrm>
+          <a:prstGeom prst="rect">
+            <a:avLst/>
+          </a:prstGeom>
+          <a:noFill/>
+          <a:ln>
+            <a:noFill/>
+          </a:ln>
+        </p:spPr>
+        <p:txBody>
+          <a:bodyPr wrap="square" rtlCol="0">
+            <a:spAutoFit/>
+          </a:bodyPr>
+          <a:lstStyle/>
+          <a:p>
+            <a:r>
+              <a:rPr lang="de-DE" sz="1000" dirty="0" smtClean="0">
+                <a:latin typeface="Palatino Linotype" panose="02040502050505030304" pitchFamily="18" charset="0"/>
+              </a:rPr>
+              <a:t>95</a:t>
+            </a:r>
+            <a:endParaRPr lang="de-DE" sz="1000" dirty="0">
+              <a:latin typeface="Palatino Linotype" panose="02040502050505030304" pitchFamily="18" charset="0"/>
+            </a:endParaRPr>
+          </a:p>
+        </p:txBody>
+      </p:sp>
+      <p:cxnSp>
+        <p:nvCxnSpPr>
+          <p:cNvPr id="51" name="Gerader Verbinder 50"/>
+          <p:cNvCxnSpPr/>
+          <p:nvPr/>
+        </p:nvCxnSpPr>
+        <p:spPr>
+          <a:xfrm flipV="1">
+            <a:off x="3801899" y="409574"/>
+            <a:ext cx="0" cy="360000"/>
+          </a:xfrm>
+          <a:prstGeom prst="line">
+            <a:avLst/>
+          </a:prstGeom>
+          <a:ln>
+            <a:solidFill>
+              <a:schemeClr val="tx1"/>
+            </a:solidFill>
+          </a:ln>
+        </p:spPr>
+        <p:style>
+          <a:lnRef idx="1">
+            <a:schemeClr val="accent1"/>
+          </a:lnRef>
+          <a:fillRef idx="0">
+            <a:schemeClr val="accent1"/>
+          </a:fillRef>
+          <a:effectRef idx="0">
+            <a:schemeClr val="accent1"/>
+          </a:effectRef>
+          <a:fontRef idx="minor">
+            <a:schemeClr val="tx1"/>
+          </a:fontRef>
+        </p:style>
+      </p:cxnSp>
+      <p:cxnSp>
+        <p:nvCxnSpPr>
+          <p:cNvPr id="54" name="Gerade Verbindung mit Pfeil 53"/>
+          <p:cNvCxnSpPr/>
+          <p:nvPr/>
+        </p:nvCxnSpPr>
+        <p:spPr>
+          <a:xfrm>
+            <a:off x="5983124" y="575862"/>
+            <a:ext cx="1800000" cy="0"/>
+          </a:xfrm>
+          <a:prstGeom prst="straightConnector1">
+            <a:avLst/>
+          </a:prstGeom>
+          <a:ln>
+            <a:solidFill>
+              <a:schemeClr val="tx1"/>
+            </a:solidFill>
+            <a:tailEnd type="triangle"/>
+          </a:ln>
+        </p:spPr>
+        <p:style>
+          <a:lnRef idx="1">
+            <a:schemeClr val="accent1"/>
+          </a:lnRef>
+          <a:fillRef idx="0">
+            <a:schemeClr val="accent1"/>
+          </a:fillRef>
+          <a:effectRef idx="0">
+            <a:schemeClr val="accent1"/>
+          </a:effectRef>
+          <a:fontRef idx="minor">
+            <a:schemeClr val="tx1"/>
+          </a:fontRef>
+        </p:style>
+      </p:cxnSp>
+      <p:cxnSp>
+        <p:nvCxnSpPr>
+          <p:cNvPr id="57" name="Gerade Verbindung mit Pfeil 56"/>
+          <p:cNvCxnSpPr/>
+          <p:nvPr/>
+        </p:nvCxnSpPr>
+        <p:spPr>
+          <a:xfrm flipH="1">
+            <a:off x="3802172" y="585387"/>
+            <a:ext cx="1800000" cy="0"/>
+          </a:xfrm>
+          <a:prstGeom prst="straightConnector1">
+            <a:avLst/>
+          </a:prstGeom>
+          <a:ln>
+            <a:solidFill>
+              <a:schemeClr val="tx1"/>
+            </a:solidFill>
+            <a:tailEnd type="triangle"/>
+          </a:ln>
+        </p:spPr>
+        <p:style>
+          <a:lnRef idx="1">
+            <a:schemeClr val="accent1"/>
+          </a:lnRef>
+          <a:fillRef idx="0">
+            <a:schemeClr val="accent1"/>
+          </a:fillRef>
+          <a:effectRef idx="0">
+            <a:schemeClr val="accent1"/>
+          </a:effectRef>
+          <a:fontRef idx="minor">
+            <a:schemeClr val="tx1"/>
+          </a:fontRef>
+        </p:style>
+      </p:cxnSp>
+      <p:sp>
+        <p:nvSpPr>
+          <p:cNvPr id="59" name="Textfeld 58"/>
+          <p:cNvSpPr txBox="1"/>
+          <p:nvPr/>
+        </p:nvSpPr>
+        <p:spPr>
+          <a:xfrm>
+            <a:off x="5611154" y="455605"/>
+            <a:ext cx="414433" cy="246221"/>
+          </a:xfrm>
+          <a:prstGeom prst="rect">
+            <a:avLst/>
+          </a:prstGeom>
+          <a:noFill/>
+          <a:ln>
+            <a:noFill/>
+          </a:ln>
+        </p:spPr>
+        <p:txBody>
+          <a:bodyPr wrap="square" rtlCol="0">
+            <a:spAutoFit/>
+          </a:bodyPr>
+          <a:lstStyle/>
+          <a:p>
+            <a:r>
+              <a:rPr lang="de-DE" sz="1000" dirty="0" smtClean="0">
+                <a:latin typeface="Palatino Linotype" panose="02040502050505030304" pitchFamily="18" charset="0"/>
+              </a:rPr>
+              <a:t>550</a:t>
+            </a:r>
+            <a:endParaRPr lang="de-DE" sz="1000" dirty="0">
+              <a:latin typeface="Palatino Linotype" panose="02040502050505030304" pitchFamily="18" charset="0"/>
+            </a:endParaRPr>
+          </a:p>
+        </p:txBody>
+      </p:sp>
+      <p:cxnSp>
+        <p:nvCxnSpPr>
+          <p:cNvPr id="61" name="Gerader Verbinder 60"/>
+          <p:cNvCxnSpPr/>
+          <p:nvPr/>
+        </p:nvCxnSpPr>
+        <p:spPr>
+          <a:xfrm flipV="1">
+            <a:off x="5238299" y="695324"/>
+            <a:ext cx="0" cy="360000"/>
+          </a:xfrm>
+          <a:prstGeom prst="line">
+            <a:avLst/>
+          </a:prstGeom>
+          <a:ln>
+            <a:solidFill>
+              <a:schemeClr val="tx1"/>
+            </a:solidFill>
+          </a:ln>
+        </p:spPr>
+        <p:style>
+          <a:lnRef idx="1">
+            <a:schemeClr val="accent1"/>
+          </a:lnRef>
+          <a:fillRef idx="0">
+            <a:schemeClr val="accent1"/>
+          </a:fillRef>
+          <a:effectRef idx="0">
+            <a:schemeClr val="accent1"/>
+          </a:effectRef>
+          <a:fontRef idx="minor">
+            <a:schemeClr val="tx1"/>
+          </a:fontRef>
+        </p:style>
+      </p:cxnSp>
+      <p:cxnSp>
+        <p:nvCxnSpPr>
+          <p:cNvPr id="64" name="Gerader Verbinder 63"/>
+          <p:cNvCxnSpPr/>
+          <p:nvPr/>
+        </p:nvCxnSpPr>
+        <p:spPr>
+          <a:xfrm flipV="1">
+            <a:off x="6344549" y="695324"/>
+            <a:ext cx="0" cy="360000"/>
+          </a:xfrm>
+          <a:prstGeom prst="line">
+            <a:avLst/>
+          </a:prstGeom>
+          <a:ln>
+            <a:solidFill>
+              <a:schemeClr val="tx1"/>
+            </a:solidFill>
+          </a:ln>
+        </p:spPr>
+        <p:style>
+          <a:lnRef idx="1">
+            <a:schemeClr val="accent1"/>
+          </a:lnRef>
+          <a:fillRef idx="0">
+            <a:schemeClr val="accent1"/>
+          </a:fillRef>
+          <a:effectRef idx="0">
+            <a:schemeClr val="accent1"/>
+          </a:effectRef>
+          <a:fontRef idx="minor">
+            <a:schemeClr val="tx1"/>
+          </a:fontRef>
+        </p:style>
+      </p:cxnSp>
+      <p:cxnSp>
+        <p:nvCxnSpPr>
+          <p:cNvPr id="67" name="Gerade Verbindung mit Pfeil 66"/>
+          <p:cNvCxnSpPr/>
+          <p:nvPr/>
+        </p:nvCxnSpPr>
+        <p:spPr>
+          <a:xfrm>
+            <a:off x="5990204" y="871137"/>
+            <a:ext cx="360000" cy="0"/>
+          </a:xfrm>
+          <a:prstGeom prst="straightConnector1">
+            <a:avLst/>
+          </a:prstGeom>
+          <a:ln>
+            <a:solidFill>
+              <a:schemeClr val="tx1"/>
+            </a:solidFill>
+            <a:tailEnd type="triangle"/>
+          </a:ln>
+        </p:spPr>
+        <p:style>
+          <a:lnRef idx="1">
+            <a:schemeClr val="accent1"/>
+          </a:lnRef>
+          <a:fillRef idx="0">
+            <a:schemeClr val="accent1"/>
+          </a:fillRef>
+          <a:effectRef idx="0">
+            <a:schemeClr val="accent1"/>
+          </a:effectRef>
+          <a:fontRef idx="minor">
+            <a:schemeClr val="tx1"/>
+          </a:fontRef>
+        </p:style>
+      </p:cxnSp>
+      <p:cxnSp>
+        <p:nvCxnSpPr>
+          <p:cNvPr id="68" name="Gerade Verbindung mit Pfeil 67"/>
+          <p:cNvCxnSpPr/>
+          <p:nvPr/>
+        </p:nvCxnSpPr>
+        <p:spPr>
+          <a:xfrm flipH="1">
+            <a:off x="5238298" y="871137"/>
+            <a:ext cx="360000" cy="0"/>
+          </a:xfrm>
+          <a:prstGeom prst="straightConnector1">
+            <a:avLst/>
+          </a:prstGeom>
+          <a:ln>
+            <a:solidFill>
+              <a:schemeClr val="tx1"/>
+            </a:solidFill>
+            <a:tailEnd type="triangle"/>
+          </a:ln>
+        </p:spPr>
+        <p:style>
+          <a:lnRef idx="1">
+            <a:schemeClr val="accent1"/>
+          </a:lnRef>
+          <a:fillRef idx="0">
+            <a:schemeClr val="accent1"/>
+          </a:fillRef>
+          <a:effectRef idx="0">
+            <a:schemeClr val="accent1"/>
+          </a:effectRef>
+          <a:fontRef idx="minor">
+            <a:schemeClr val="tx1"/>
+          </a:fontRef>
+        </p:style>
+      </p:cxnSp>
+      <p:cxnSp>
+        <p:nvCxnSpPr>
+          <p:cNvPr id="69" name="Gerade Verbindung mit Pfeil 68"/>
+          <p:cNvCxnSpPr/>
+          <p:nvPr/>
+        </p:nvCxnSpPr>
+        <p:spPr>
+          <a:xfrm flipV="1">
+            <a:off x="3590770" y="4675505"/>
+            <a:ext cx="0" cy="180000"/>
+          </a:xfrm>
+          <a:prstGeom prst="straightConnector1">
+            <a:avLst/>
+          </a:prstGeom>
+          <a:ln>
+            <a:solidFill>
+              <a:schemeClr val="tx1"/>
+            </a:solidFill>
+            <a:tailEnd type="triangle"/>
+          </a:ln>
+        </p:spPr>
+        <p:style>
+          <a:lnRef idx="1">
+            <a:schemeClr val="accent1"/>
+          </a:lnRef>
+          <a:fillRef idx="0">
+            <a:schemeClr val="accent1"/>
+          </a:fillRef>
+          <a:effectRef idx="0">
+            <a:schemeClr val="accent1"/>
+          </a:effectRef>
+          <a:fontRef idx="minor">
+            <a:schemeClr val="tx1"/>
+          </a:fontRef>
+        </p:style>
+      </p:cxnSp>
+      <p:sp>
+        <p:nvSpPr>
+          <p:cNvPr id="70" name="Textfeld 69"/>
+          <p:cNvSpPr txBox="1"/>
+          <p:nvPr/>
+        </p:nvSpPr>
+        <p:spPr>
+          <a:xfrm>
+            <a:off x="5625149" y="766362"/>
+            <a:ext cx="375602" cy="246221"/>
+          </a:xfrm>
+          <a:prstGeom prst="rect">
+            <a:avLst/>
+          </a:prstGeom>
+          <a:noFill/>
+          <a:ln>
+            <a:noFill/>
+          </a:ln>
+        </p:spPr>
+        <p:txBody>
+          <a:bodyPr wrap="square" rtlCol="0">
+            <a:spAutoFit/>
+          </a:bodyPr>
+          <a:lstStyle/>
+          <a:p>
+            <a:r>
+              <a:rPr lang="de-DE" sz="1000" dirty="0" smtClean="0">
+                <a:latin typeface="Palatino Linotype" panose="02040502050505030304" pitchFamily="18" charset="0"/>
+              </a:rPr>
+              <a:t>94</a:t>
+            </a:r>
+          </a:p>
+        </p:txBody>
+      </p:sp>
+      <p:cxnSp>
+        <p:nvCxnSpPr>
+          <p:cNvPr id="72" name="Gerader Verbinder 71"/>
+          <p:cNvCxnSpPr/>
+          <p:nvPr/>
+        </p:nvCxnSpPr>
+        <p:spPr>
+          <a:xfrm flipH="1">
+            <a:off x="3018890" y="1751614"/>
+            <a:ext cx="360000" cy="0"/>
+          </a:xfrm>
+          <a:prstGeom prst="line">
+            <a:avLst/>
+          </a:prstGeom>
+          <a:ln>
+            <a:solidFill>
+              <a:schemeClr val="tx1"/>
+            </a:solidFill>
+          </a:ln>
+        </p:spPr>
+        <p:style>
+          <a:lnRef idx="1">
+            <a:schemeClr val="accent1"/>
+          </a:lnRef>
+          <a:fillRef idx="0">
+            <a:schemeClr val="accent1"/>
+          </a:fillRef>
+          <a:effectRef idx="0">
+            <a:schemeClr val="accent1"/>
+          </a:effectRef>
+          <a:fontRef idx="minor">
+            <a:schemeClr val="tx1"/>
+          </a:fontRef>
+        </p:style>
+      </p:cxnSp>
+      <p:cxnSp>
+        <p:nvCxnSpPr>
+          <p:cNvPr id="79" name="Gerade Verbindung mit Pfeil 78"/>
+          <p:cNvCxnSpPr/>
+          <p:nvPr/>
+        </p:nvCxnSpPr>
+        <p:spPr>
+          <a:xfrm flipH="1" flipV="1">
+            <a:off x="3200400" y="2418364"/>
+            <a:ext cx="0" cy="1260000"/>
+          </a:xfrm>
+          <a:prstGeom prst="straightConnector1">
+            <a:avLst/>
+          </a:prstGeom>
+          <a:ln>
+            <a:solidFill>
+              <a:schemeClr val="tx1"/>
+            </a:solidFill>
+            <a:tailEnd type="triangle"/>
+          </a:ln>
+        </p:spPr>
+        <p:style>
+          <a:lnRef idx="1">
+            <a:schemeClr val="accent1"/>
+          </a:lnRef>
+          <a:fillRef idx="0">
+            <a:schemeClr val="accent1"/>
+          </a:fillRef>
+          <a:effectRef idx="0">
+            <a:schemeClr val="accent1"/>
+          </a:effectRef>
+          <a:fontRef idx="minor">
+            <a:schemeClr val="tx1"/>
+          </a:fontRef>
+        </p:style>
+      </p:cxnSp>
+      <p:cxnSp>
+        <p:nvCxnSpPr>
+          <p:cNvPr id="82" name="Gerade Verbindung mit Pfeil 81"/>
+          <p:cNvCxnSpPr/>
+          <p:nvPr/>
+        </p:nvCxnSpPr>
+        <p:spPr>
+          <a:xfrm flipH="1">
+            <a:off x="3200400" y="4066189"/>
+            <a:ext cx="0" cy="1260000"/>
+          </a:xfrm>
+          <a:prstGeom prst="straightConnector1">
+            <a:avLst/>
+          </a:prstGeom>
+          <a:ln>
+            <a:solidFill>
+              <a:schemeClr val="tx1"/>
+            </a:solidFill>
+            <a:tailEnd type="triangle"/>
+          </a:ln>
+        </p:spPr>
+        <p:style>
+          <a:lnRef idx="1">
+            <a:schemeClr val="accent1"/>
+          </a:lnRef>
+          <a:fillRef idx="0">
+            <a:schemeClr val="accent1"/>
+          </a:fillRef>
+          <a:effectRef idx="0">
+            <a:schemeClr val="accent1"/>
+          </a:effectRef>
+          <a:fontRef idx="minor">
+            <a:schemeClr val="tx1"/>
+          </a:fontRef>
+        </p:style>
+      </p:cxnSp>
+      <p:sp>
+        <p:nvSpPr>
+          <p:cNvPr id="84" name="Textfeld 83"/>
+          <p:cNvSpPr txBox="1"/>
+          <p:nvPr/>
+        </p:nvSpPr>
+        <p:spPr>
+          <a:xfrm rot="16200000">
+            <a:off x="2989056" y="3703963"/>
+            <a:ext cx="455933" cy="246221"/>
+          </a:xfrm>
+          <a:prstGeom prst="rect">
+            <a:avLst/>
+          </a:prstGeom>
+          <a:noFill/>
+          <a:ln>
+            <a:noFill/>
+          </a:ln>
+        </p:spPr>
+        <p:txBody>
+          <a:bodyPr wrap="square" rtlCol="0">
+            <a:spAutoFit/>
+          </a:bodyPr>
+          <a:lstStyle/>
+          <a:p>
+            <a:r>
+              <a:rPr lang="de-DE" sz="1000" dirty="0" smtClean="0">
+                <a:latin typeface="Palatino Linotype" panose="02040502050505030304" pitchFamily="18" charset="0"/>
+              </a:rPr>
+              <a:t>330 </a:t>
+            </a:r>
+            <a:endParaRPr lang="de-DE" sz="1000" dirty="0">
+              <a:latin typeface="Palatino Linotype" panose="02040502050505030304" pitchFamily="18" charset="0"/>
+            </a:endParaRPr>
+          </a:p>
+        </p:txBody>
+      </p:sp>
+      <p:cxnSp>
+        <p:nvCxnSpPr>
+          <p:cNvPr id="87" name="Gerade Verbindung mit Pfeil 86"/>
+          <p:cNvCxnSpPr/>
+          <p:nvPr/>
+        </p:nvCxnSpPr>
+        <p:spPr>
+          <a:xfrm flipV="1">
+            <a:off x="3204130" y="1752868"/>
+            <a:ext cx="0" cy="180000"/>
+          </a:xfrm>
+          <a:prstGeom prst="straightConnector1">
+            <a:avLst/>
+          </a:prstGeom>
+          <a:ln>
+            <a:solidFill>
+              <a:schemeClr val="tx1"/>
+            </a:solidFill>
+            <a:tailEnd type="triangle"/>
+          </a:ln>
+        </p:spPr>
+        <p:style>
+          <a:lnRef idx="1">
+            <a:schemeClr val="accent1"/>
+          </a:lnRef>
+          <a:fillRef idx="0">
+            <a:schemeClr val="accent1"/>
+          </a:fillRef>
+          <a:effectRef idx="0">
+            <a:schemeClr val="accent1"/>
+          </a:effectRef>
+          <a:fontRef idx="minor">
+            <a:schemeClr val="tx1"/>
+          </a:fontRef>
+        </p:style>
+      </p:cxnSp>
+      <p:sp>
+        <p:nvSpPr>
+          <p:cNvPr id="88" name="Textfeld 87"/>
+          <p:cNvSpPr txBox="1"/>
+          <p:nvPr/>
+        </p:nvSpPr>
+        <p:spPr>
+          <a:xfrm>
+            <a:off x="9572625" y="6276975"/>
+            <a:ext cx="1228725" cy="307777"/>
+          </a:xfrm>
+          <a:prstGeom prst="rect">
+            <a:avLst/>
+          </a:prstGeom>
+          <a:noFill/>
+          <a:ln>
+            <a:noFill/>
+          </a:ln>
+        </p:spPr>
+        <p:txBody>
+          <a:bodyPr wrap="square" rtlCol="0">
+            <a:spAutoFit/>
+          </a:bodyPr>
+          <a:lstStyle/>
+          <a:p>
+            <a:r>
+              <a:rPr lang="de-DE" sz="1400" dirty="0" smtClean="0">
+                <a:latin typeface="Palatino Linotype" panose="02040502050505030304" pitchFamily="18" charset="0"/>
+              </a:rPr>
+              <a:t>Maße in mm</a:t>
+            </a:r>
+            <a:endParaRPr lang="de-DE" sz="1400" dirty="0">
+              <a:latin typeface="Palatino Linotype" panose="02040502050505030304" pitchFamily="18" charset="0"/>
+            </a:endParaRPr>
+          </a:p>
+        </p:txBody>
+      </p:sp>
+      <p:cxnSp>
+        <p:nvCxnSpPr>
+          <p:cNvPr id="93" name="Gerader Verbinder 92"/>
+          <p:cNvCxnSpPr/>
+          <p:nvPr/>
+        </p:nvCxnSpPr>
+        <p:spPr>
+          <a:xfrm flipV="1">
+            <a:off x="7783349" y="400049"/>
+            <a:ext cx="0" cy="360000"/>
+          </a:xfrm>
+          <a:prstGeom prst="line">
+            <a:avLst/>
+          </a:prstGeom>
+          <a:ln>
+            <a:solidFill>
+              <a:schemeClr val="tx1"/>
+            </a:solidFill>
+          </a:ln>
+        </p:spPr>
+        <p:style>
+          <a:lnRef idx="1">
+            <a:schemeClr val="accent1"/>
+          </a:lnRef>
+          <a:fillRef idx="0">
+            <a:schemeClr val="accent1"/>
+          </a:fillRef>
+          <a:effectRef idx="0">
+            <a:schemeClr val="accent1"/>
+          </a:effectRef>
+          <a:fontRef idx="minor">
+            <a:schemeClr val="tx1"/>
+          </a:fontRef>
+        </p:style>
+      </p:cxnSp>
     </p:spTree>
     <p:extLst>
       <p:ext uri="{BB962C8B-B14F-4D97-AF65-F5344CB8AC3E}">

</xml_diff>